<commit_message>
Changed allowed cheat sheet
</commit_message>
<xml_diff>
--- a/Teaching/Courses/F23/CIS500/LectureNotes/cis500_intro.pptx
+++ b/Teaching/Courses/F23/CIS500/LectureNotes/cis500_intro.pptx
@@ -6555,26 +6555,20 @@
             <a:pPr lvl="1"/>
             <a:r>
               <a:rPr lang="en-US" dirty="0"/>
-              <a:t>One page (one side) of notes</a:t>
+              <a:t>A one-page Python reference sheet</a:t>
             </a:r>
           </a:p>
           <a:p>
             <a:pPr lvl="1"/>
             <a:r>
-              <a:rPr lang="en-US" i="1" u="sng" dirty="0"/>
-              <a:t>Your</a:t>
-            </a:r>
-            <a:r>
-              <a:rPr lang="en-US" dirty="0"/>
-              <a:t> notes, written by you</a:t>
-            </a:r>
-          </a:p>
-          <a:p>
-            <a:pPr lvl="1"/>
-            <a:r>
-              <a:rPr lang="en-US" dirty="0"/>
-              <a:t>Use for syntax reminders</a:t>
-            </a:r>
+              <a:rPr lang="en-US" dirty="0"/>
+              <a:t>Must submit </a:t>
+            </a:r>
+            <a:r>
+              <a:rPr lang="en-US"/>
+              <a:t>for approval</a:t>
+            </a:r>
+            <a:endParaRPr lang="en-US" dirty="0"/>
           </a:p>
           <a:p>
             <a:r>
@@ -6735,39 +6729,26 @@
                                   </p:childTnLst>
                                 </p:cTn>
                               </p:par>
+                            </p:childTnLst>
+                          </p:cTn>
+                        </p:par>
+                      </p:childTnLst>
+                    </p:cTn>
+                  </p:par>
+                  <p:par>
+                    <p:cTn id="9" fill="hold">
+                      <p:stCondLst>
+                        <p:cond delay="indefinite"/>
+                      </p:stCondLst>
+                      <p:childTnLst>
+                        <p:par>
+                          <p:cTn id="10" fill="hold">
+                            <p:stCondLst>
+                              <p:cond delay="0"/>
+                            </p:stCondLst>
+                            <p:childTnLst>
                               <p:par>
-                                <p:cTn id="9" presetID="1" presetClass="entr" presetSubtype="0" fill="hold" grpId="0" nodeType="withEffect">
-                                  <p:stCondLst>
-                                    <p:cond delay="0"/>
-                                  </p:stCondLst>
-                                  <p:childTnLst>
-                                    <p:set>
-                                      <p:cBhvr>
-                                        <p:cTn id="10" dur="1" fill="hold">
-                                          <p:stCondLst>
-                                            <p:cond delay="0"/>
-                                          </p:stCondLst>
-                                        </p:cTn>
-                                        <p:tgtEl>
-                                          <p:spTgt spid="3">
-                                            <p:txEl>
-                                              <p:pRg st="2" end="2"/>
-                                            </p:txEl>
-                                          </p:spTgt>
-                                        </p:tgtEl>
-                                        <p:attrNameLst>
-                                          <p:attrName>style.visibility</p:attrName>
-                                        </p:attrNameLst>
-                                      </p:cBhvr>
-                                      <p:to>
-                                        <p:strVal val="visible"/>
-                                      </p:to>
-                                    </p:set>
-                                  </p:childTnLst>
-                                </p:cTn>
-                              </p:par>
-                              <p:par>
-                                <p:cTn id="11" presetID="1" presetClass="entr" presetSubtype="0" fill="hold" grpId="0" nodeType="withEffect">
+                                <p:cTn id="11" presetID="1" presetClass="entr" presetSubtype="0" fill="hold" grpId="0" nodeType="clickEffect">
                                   <p:stCondLst>
                                     <p:cond delay="0"/>
                                   </p:stCondLst>
@@ -6782,7 +6763,7 @@
                                         <p:tgtEl>
                                           <p:spTgt spid="3">
                                             <p:txEl>
-                                              <p:pRg st="3" end="3"/>
+                                              <p:pRg st="2" end="2"/>
                                             </p:txEl>
                                           </p:spTgt>
                                         </p:tgtEl>
@@ -6831,7 +6812,7 @@
                                         <p:tgtEl>
                                           <p:spTgt spid="3">
                                             <p:txEl>
-                                              <p:pRg st="4" end="4"/>
+                                              <p:pRg st="3" end="3"/>
                                             </p:txEl>
                                           </p:spTgt>
                                         </p:tgtEl>
@@ -6880,7 +6861,7 @@
                                         <p:tgtEl>
                                           <p:spTgt spid="3">
                                             <p:txEl>
-                                              <p:pRg st="5" end="5"/>
+                                              <p:pRg st="4" end="4"/>
                                             </p:txEl>
                                           </p:spTgt>
                                         </p:tgtEl>
@@ -6929,7 +6910,7 @@
                                         <p:tgtEl>
                                           <p:spTgt spid="3">
                                             <p:txEl>
-                                              <p:pRg st="6" end="6"/>
+                                              <p:pRg st="5" end="5"/>
                                             </p:txEl>
                                           </p:spTgt>
                                         </p:tgtEl>
@@ -6960,7 +6941,7 @@
                                         <p:tgtEl>
                                           <p:spTgt spid="3">
                                             <p:txEl>
-                                              <p:pRg st="7" end="7"/>
+                                              <p:pRg st="6" end="6"/>
                                             </p:txEl>
                                           </p:spTgt>
                                         </p:tgtEl>
@@ -6991,7 +6972,7 @@
                                         <p:tgtEl>
                                           <p:spTgt spid="3">
                                             <p:txEl>
-                                              <p:pRg st="8" end="8"/>
+                                              <p:pRg st="7" end="7"/>
                                             </p:txEl>
                                           </p:spTgt>
                                         </p:tgtEl>
@@ -7022,7 +7003,7 @@
                                         <p:tgtEl>
                                           <p:spTgt spid="3">
                                             <p:txEl>
-                                              <p:pRg st="9" end="9"/>
+                                              <p:pRg st="8" end="8"/>
                                             </p:txEl>
                                           </p:spTgt>
                                         </p:tgtEl>
@@ -7071,7 +7052,7 @@
                                         <p:tgtEl>
                                           <p:spTgt spid="3">
                                             <p:txEl>
-                                              <p:pRg st="10" end="10"/>
+                                              <p:pRg st="9" end="9"/>
                                             </p:txEl>
                                           </p:spTgt>
                                         </p:tgtEl>
@@ -7120,7 +7101,7 @@
                                         <p:tgtEl>
                                           <p:spTgt spid="3">
                                             <p:txEl>
-                                              <p:pRg st="11" end="11"/>
+                                              <p:pRg st="10" end="10"/>
                                             </p:txEl>
                                           </p:spTgt>
                                         </p:tgtEl>
@@ -7277,11 +7258,7 @@
           <a:p>
             <a:r>
               <a:rPr lang="en-US" dirty="0"/>
-              <a:t>Asking classmates, friends, family high-level general questions </a:t>
-            </a:r>
-            <a:r>
-              <a:rPr lang="en-US"/>
-              <a:t>is encouraged.</a:t>
+              <a:t>Asking classmates, friends, family high-level general questions is encouraged.</a:t>
             </a:r>
           </a:p>
         </p:txBody>

</xml_diff>